<commit_message>
added pics to thermal analysis
</commit_message>
<xml_diff>
--- a/reports/preliminary_design_report.pptx
+++ b/reports/preliminary_design_report.pptx
@@ -113,6 +113,11 @@
       </a:defRPr>
     </a:lvl9pPr>
   </p:defaultTextStyle>
+  <p:extLst>
+    <p:ext uri="{EFAFB233-063F-42B5-8137-9DF3F51BA10A}">
+      <p15:sldGuideLst xmlns:p15="http://schemas.microsoft.com/office/powerpoint/2012/main"/>
+    </p:ext>
+  </p:extLst>
 </p:presentation>
 </file>
 
@@ -198,7 +203,7 @@
           <a:p>
             <a:fld id="{F957D08C-12C4-471F-817E-F5FC90950A2A}" type="datetimeFigureOut">
               <a:rPr lang="en-US" smtClean="0"/>
-              <a:t>2/14/2022</a:t>
+              <a:t>2/15/2022</a:t>
             </a:fld>
             <a:endParaRPr lang="en-US"/>
           </a:p>
@@ -815,7 +820,7 @@
           <a:p>
             <a:fld id="{6F8803D4-76D4-4500-9DEE-182D5C2E3524}" type="datetimeFigureOut">
               <a:rPr lang="en-US" smtClean="0"/>
-              <a:t>2/14/2022</a:t>
+              <a:t>2/15/2022</a:t>
             </a:fld>
             <a:endParaRPr lang="en-US"/>
           </a:p>
@@ -1013,7 +1018,7 @@
           <a:p>
             <a:fld id="{6F8803D4-76D4-4500-9DEE-182D5C2E3524}" type="datetimeFigureOut">
               <a:rPr lang="en-US" smtClean="0"/>
-              <a:t>2/14/2022</a:t>
+              <a:t>2/15/2022</a:t>
             </a:fld>
             <a:endParaRPr lang="en-US"/>
           </a:p>
@@ -1221,7 +1226,7 @@
           <a:p>
             <a:fld id="{6F8803D4-76D4-4500-9DEE-182D5C2E3524}" type="datetimeFigureOut">
               <a:rPr lang="en-US" smtClean="0"/>
-              <a:t>2/14/2022</a:t>
+              <a:t>2/15/2022</a:t>
             </a:fld>
             <a:endParaRPr lang="en-US"/>
           </a:p>
@@ -1419,7 +1424,7 @@
           <a:p>
             <a:fld id="{6F8803D4-76D4-4500-9DEE-182D5C2E3524}" type="datetimeFigureOut">
               <a:rPr lang="en-US" smtClean="0"/>
-              <a:t>2/14/2022</a:t>
+              <a:t>2/15/2022</a:t>
             </a:fld>
             <a:endParaRPr lang="en-US"/>
           </a:p>
@@ -1694,7 +1699,7 @@
           <a:p>
             <a:fld id="{6F8803D4-76D4-4500-9DEE-182D5C2E3524}" type="datetimeFigureOut">
               <a:rPr lang="en-US" smtClean="0"/>
-              <a:t>2/14/2022</a:t>
+              <a:t>2/15/2022</a:t>
             </a:fld>
             <a:endParaRPr lang="en-US"/>
           </a:p>
@@ -1959,7 +1964,7 @@
           <a:p>
             <a:fld id="{6F8803D4-76D4-4500-9DEE-182D5C2E3524}" type="datetimeFigureOut">
               <a:rPr lang="en-US" smtClean="0"/>
-              <a:t>2/14/2022</a:t>
+              <a:t>2/15/2022</a:t>
             </a:fld>
             <a:endParaRPr lang="en-US"/>
           </a:p>
@@ -2371,7 +2376,7 @@
           <a:p>
             <a:fld id="{6F8803D4-76D4-4500-9DEE-182D5C2E3524}" type="datetimeFigureOut">
               <a:rPr lang="en-US" smtClean="0"/>
-              <a:t>2/14/2022</a:t>
+              <a:t>2/15/2022</a:t>
             </a:fld>
             <a:endParaRPr lang="en-US"/>
           </a:p>
@@ -2512,7 +2517,7 @@
           <a:p>
             <a:fld id="{6F8803D4-76D4-4500-9DEE-182D5C2E3524}" type="datetimeFigureOut">
               <a:rPr lang="en-US" smtClean="0"/>
-              <a:t>2/14/2022</a:t>
+              <a:t>2/15/2022</a:t>
             </a:fld>
             <a:endParaRPr lang="en-US"/>
           </a:p>
@@ -2625,7 +2630,7 @@
           <a:p>
             <a:fld id="{6F8803D4-76D4-4500-9DEE-182D5C2E3524}" type="datetimeFigureOut">
               <a:rPr lang="en-US" smtClean="0"/>
-              <a:t>2/14/2022</a:t>
+              <a:t>2/15/2022</a:t>
             </a:fld>
             <a:endParaRPr lang="en-US"/>
           </a:p>
@@ -2936,7 +2941,7 @@
           <a:p>
             <a:fld id="{6F8803D4-76D4-4500-9DEE-182D5C2E3524}" type="datetimeFigureOut">
               <a:rPr lang="en-US" smtClean="0"/>
-              <a:t>2/14/2022</a:t>
+              <a:t>2/15/2022</a:t>
             </a:fld>
             <a:endParaRPr lang="en-US"/>
           </a:p>
@@ -3224,7 +3229,7 @@
           <a:p>
             <a:fld id="{6F8803D4-76D4-4500-9DEE-182D5C2E3524}" type="datetimeFigureOut">
               <a:rPr lang="en-US" smtClean="0"/>
-              <a:t>2/14/2022</a:t>
+              <a:t>2/15/2022</a:t>
             </a:fld>
             <a:endParaRPr lang="en-US"/>
           </a:p>
@@ -3465,7 +3470,7 @@
           <a:p>
             <a:fld id="{6F8803D4-76D4-4500-9DEE-182D5C2E3524}" type="datetimeFigureOut">
               <a:rPr lang="en-US" smtClean="0"/>
-              <a:t>2/14/2022</a:t>
+              <a:t>2/15/2022</a:t>
             </a:fld>
             <a:endParaRPr lang="en-US"/>
           </a:p>
@@ -5543,9 +5548,10 @@
           <a:lstStyle/>
           <a:p>
             <a:r>
-              <a:rPr lang="en-US" dirty="0"/>
-              <a:t>Preliminary Analysis</a:t>
-            </a:r>
+              <a:rPr lang="en-US"/>
+              <a:t>Preliminary Thermal Analysis</a:t>
+            </a:r>
+            <a:endParaRPr lang="en-US" dirty="0"/>
           </a:p>
         </p:txBody>
       </p:sp>

</xml_diff>